<commit_message>
REALLY should've committed periodically
</commit_message>
<xml_diff>
--- a/Notes/Stickers for Emergency Shut-off.pptx
+++ b/Notes/Stickers for Emergency Shut-off.pptx
@@ -243,7 +243,7 @@
           <a:p>
             <a:fld id="{23FC8003-D1FD-40A9-8CDF-D6083333302A}" type="datetimeFigureOut">
               <a:rPr lang="en-US" smtClean="0"/>
-              <a:t>5/6/2022</a:t>
+              <a:t>5/11/2022</a:t>
             </a:fld>
             <a:endParaRPr lang="en-US"/>
           </a:p>
@@ -413,7 +413,7 @@
           <a:p>
             <a:fld id="{23FC8003-D1FD-40A9-8CDF-D6083333302A}" type="datetimeFigureOut">
               <a:rPr lang="en-US" smtClean="0"/>
-              <a:t>5/6/2022</a:t>
+              <a:t>5/11/2022</a:t>
             </a:fld>
             <a:endParaRPr lang="en-US"/>
           </a:p>
@@ -593,7 +593,7 @@
           <a:p>
             <a:fld id="{23FC8003-D1FD-40A9-8CDF-D6083333302A}" type="datetimeFigureOut">
               <a:rPr lang="en-US" smtClean="0"/>
-              <a:t>5/6/2022</a:t>
+              <a:t>5/11/2022</a:t>
             </a:fld>
             <a:endParaRPr lang="en-US"/>
           </a:p>
@@ -763,7 +763,7 @@
           <a:p>
             <a:fld id="{23FC8003-D1FD-40A9-8CDF-D6083333302A}" type="datetimeFigureOut">
               <a:rPr lang="en-US" smtClean="0"/>
-              <a:t>5/6/2022</a:t>
+              <a:t>5/11/2022</a:t>
             </a:fld>
             <a:endParaRPr lang="en-US"/>
           </a:p>
@@ -1007,7 +1007,7 @@
           <a:p>
             <a:fld id="{23FC8003-D1FD-40A9-8CDF-D6083333302A}" type="datetimeFigureOut">
               <a:rPr lang="en-US" smtClean="0"/>
-              <a:t>5/6/2022</a:t>
+              <a:t>5/11/2022</a:t>
             </a:fld>
             <a:endParaRPr lang="en-US"/>
           </a:p>
@@ -1239,7 +1239,7 @@
           <a:p>
             <a:fld id="{23FC8003-D1FD-40A9-8CDF-D6083333302A}" type="datetimeFigureOut">
               <a:rPr lang="en-US" smtClean="0"/>
-              <a:t>5/6/2022</a:t>
+              <a:t>5/11/2022</a:t>
             </a:fld>
             <a:endParaRPr lang="en-US"/>
           </a:p>
@@ -1606,7 +1606,7 @@
           <a:p>
             <a:fld id="{23FC8003-D1FD-40A9-8CDF-D6083333302A}" type="datetimeFigureOut">
               <a:rPr lang="en-US" smtClean="0"/>
-              <a:t>5/6/2022</a:t>
+              <a:t>5/11/2022</a:t>
             </a:fld>
             <a:endParaRPr lang="en-US"/>
           </a:p>
@@ -1724,7 +1724,7 @@
           <a:p>
             <a:fld id="{23FC8003-D1FD-40A9-8CDF-D6083333302A}" type="datetimeFigureOut">
               <a:rPr lang="en-US" smtClean="0"/>
-              <a:t>5/6/2022</a:t>
+              <a:t>5/11/2022</a:t>
             </a:fld>
             <a:endParaRPr lang="en-US"/>
           </a:p>
@@ -1819,7 +1819,7 @@
           <a:p>
             <a:fld id="{23FC8003-D1FD-40A9-8CDF-D6083333302A}" type="datetimeFigureOut">
               <a:rPr lang="en-US" smtClean="0"/>
-              <a:t>5/6/2022</a:t>
+              <a:t>5/11/2022</a:t>
             </a:fld>
             <a:endParaRPr lang="en-US"/>
           </a:p>
@@ -2096,7 +2096,7 @@
           <a:p>
             <a:fld id="{23FC8003-D1FD-40A9-8CDF-D6083333302A}" type="datetimeFigureOut">
               <a:rPr lang="en-US" smtClean="0"/>
-              <a:t>5/6/2022</a:t>
+              <a:t>5/11/2022</a:t>
             </a:fld>
             <a:endParaRPr lang="en-US"/>
           </a:p>
@@ -2353,7 +2353,7 @@
           <a:p>
             <a:fld id="{23FC8003-D1FD-40A9-8CDF-D6083333302A}" type="datetimeFigureOut">
               <a:rPr lang="en-US" smtClean="0"/>
-              <a:t>5/6/2022</a:t>
+              <a:t>5/11/2022</a:t>
             </a:fld>
             <a:endParaRPr lang="en-US"/>
           </a:p>
@@ -2566,7 +2566,7 @@
           <a:p>
             <a:fld id="{23FC8003-D1FD-40A9-8CDF-D6083333302A}" type="datetimeFigureOut">
               <a:rPr lang="en-US" smtClean="0"/>
-              <a:t>5/6/2022</a:t>
+              <a:t>5/11/2022</a:t>
             </a:fld>
             <a:endParaRPr lang="en-US"/>
           </a:p>
@@ -3586,13 +3586,6 @@
                 </a:rPr>
                 <a:t>EMERGENCY SHUT-OFF</a:t>
               </a:r>
-              <a:endParaRPr lang="en-US" sz="2640" b="1" dirty="0">
-                <a:solidFill>
-                  <a:srgbClr val="FF0000"/>
-                </a:solidFill>
-                <a:latin typeface="Arial" panose="020B0604020202020204" pitchFamily="34" charset="0"/>
-                <a:cs typeface="Arial" panose="020B0604020202020204" pitchFamily="34" charset="0"/>
-              </a:endParaRPr>
             </a:p>
           </p:txBody>
         </p:sp>
@@ -3800,13 +3793,6 @@
                 </a:rPr>
                 <a:t>PULL TO START      PUSH TO STOP</a:t>
               </a:r>
-              <a:endParaRPr lang="en-US" sz="2640" b="1" dirty="0">
-                <a:solidFill>
-                  <a:schemeClr val="bg1"/>
-                </a:solidFill>
-                <a:latin typeface="Arial" panose="020B0604020202020204" pitchFamily="34" charset="0"/>
-                <a:cs typeface="Arial" panose="020B0604020202020204" pitchFamily="34" charset="0"/>
-              </a:endParaRPr>
             </a:p>
           </p:txBody>
         </p:sp>
@@ -4014,13 +4000,6 @@
                 </a:rPr>
                 <a:t>PULL TO START      PUSH TO STOP</a:t>
               </a:r>
-              <a:endParaRPr lang="en-US" sz="2640" b="1" dirty="0">
-                <a:solidFill>
-                  <a:schemeClr val="bg1"/>
-                </a:solidFill>
-                <a:latin typeface="Arial" panose="020B0604020202020204" pitchFamily="34" charset="0"/>
-                <a:cs typeface="Arial" panose="020B0604020202020204" pitchFamily="34" charset="0"/>
-              </a:endParaRPr>
             </a:p>
           </p:txBody>
         </p:sp>
@@ -4228,13 +4207,6 @@
                 </a:rPr>
                 <a:t>EMERGENCY SHUT-OFF</a:t>
               </a:r>
-              <a:endParaRPr lang="en-US" sz="2640" b="1" dirty="0">
-                <a:solidFill>
-                  <a:srgbClr val="FF0000"/>
-                </a:solidFill>
-                <a:latin typeface="Arial" panose="020B0604020202020204" pitchFamily="34" charset="0"/>
-                <a:cs typeface="Arial" panose="020B0604020202020204" pitchFamily="34" charset="0"/>
-              </a:endParaRPr>
             </a:p>
           </p:txBody>
         </p:sp>
@@ -4247,7 +4219,7 @@
         </p:nvSpPr>
         <p:spPr>
           <a:xfrm>
-            <a:off x="156043" y="2854655"/>
+            <a:off x="136968" y="2946426"/>
             <a:ext cx="3996538" cy="276999"/>
           </a:xfrm>
           <a:prstGeom prst="rect">
@@ -4263,155 +4235,13 @@
           <a:p>
             <a:r>
               <a:rPr lang="en-US" sz="1200" dirty="0" smtClean="0"/>
-              <a:t>E1 closet:</a:t>
+              <a:t>E1 </a:t>
+            </a:r>
+            <a:r>
+              <a:rPr lang="en-US" sz="1200" dirty="0" smtClean="0"/>
+              <a:t>console:</a:t>
             </a:r>
             <a:endParaRPr lang="en-US" sz="1200" dirty="0"/>
-          </a:p>
-        </p:txBody>
-      </p:sp>
-      <p:sp>
-        <p:nvSpPr>
-          <p:cNvPr id="22" name="Rectangle 21"/>
-          <p:cNvSpPr/>
-          <p:nvPr/>
-        </p:nvSpPr>
-        <p:spPr>
-          <a:xfrm>
-            <a:off x="271643" y="3131654"/>
-            <a:ext cx="2682240" cy="670560"/>
-          </a:xfrm>
-          <a:prstGeom prst="rect">
-            <a:avLst/>
-          </a:prstGeom>
-          <a:solidFill>
-            <a:srgbClr val="FFFF00"/>
-          </a:solidFill>
-          <a:ln>
-            <a:solidFill>
-              <a:schemeClr val="tx1"/>
-            </a:solidFill>
-          </a:ln>
-        </p:spPr>
-        <p:style>
-          <a:lnRef idx="2">
-            <a:schemeClr val="accent1">
-              <a:shade val="50000"/>
-            </a:schemeClr>
-          </a:lnRef>
-          <a:fillRef idx="1">
-            <a:schemeClr val="accent1"/>
-          </a:fillRef>
-          <a:effectRef idx="0">
-            <a:schemeClr val="accent1"/>
-          </a:effectRef>
-          <a:fontRef idx="minor">
-            <a:schemeClr val="lt1"/>
-          </a:fontRef>
-        </p:style>
-        <p:txBody>
-          <a:bodyPr rot="0" spcFirstLastPara="0" vert="horz" wrap="square" lIns="0" tIns="201168" rIns="0" bIns="0" numCol="1" spcCol="0" rtlCol="0" fromWordArt="0" anchor="t" anchorCtr="0" forceAA="0" compatLnSpc="1">
-            <a:prstTxWarp prst="textNoShape">
-              <a:avLst/>
-            </a:prstTxWarp>
-            <a:noAutofit/>
-          </a:bodyPr>
-          <a:lstStyle/>
-          <a:p>
-            <a:pPr algn="ctr">
-              <a:lnSpc>
-                <a:spcPct val="107000"/>
-              </a:lnSpc>
-              <a:spcAft>
-                <a:spcPts val="1173"/>
-              </a:spcAft>
-            </a:pPr>
-            <a:r>
-              <a:rPr lang="en-US" sz="1760" b="1">
-                <a:solidFill>
-                  <a:srgbClr val="FF0000"/>
-                </a:solidFill>
-                <a:latin typeface="Arial" panose="020B0604020202020204" pitchFamily="34" charset="0"/>
-                <a:ea typeface="Calibri" panose="020F0502020204030204" pitchFamily="34" charset="0"/>
-              </a:rPr>
-              <a:t>EMERGENCY SHUT-OFF</a:t>
-            </a:r>
-            <a:endParaRPr lang="en-US" sz="1760">
-              <a:latin typeface="Times New Roman" panose="02020603050405020304" pitchFamily="18" charset="0"/>
-              <a:ea typeface="Calibri" panose="020F0502020204030204" pitchFamily="34" charset="0"/>
-            </a:endParaRPr>
-          </a:p>
-        </p:txBody>
-      </p:sp>
-      <p:sp>
-        <p:nvSpPr>
-          <p:cNvPr id="23" name="Rectangle 22"/>
-          <p:cNvSpPr/>
-          <p:nvPr/>
-        </p:nvSpPr>
-        <p:spPr>
-          <a:xfrm>
-            <a:off x="3077789" y="3118321"/>
-            <a:ext cx="2682240" cy="670560"/>
-          </a:xfrm>
-          <a:prstGeom prst="rect">
-            <a:avLst/>
-          </a:prstGeom>
-          <a:solidFill>
-            <a:srgbClr val="FFFF00"/>
-          </a:solidFill>
-          <a:ln>
-            <a:solidFill>
-              <a:schemeClr val="tx1"/>
-            </a:solidFill>
-          </a:ln>
-        </p:spPr>
-        <p:style>
-          <a:lnRef idx="2">
-            <a:schemeClr val="accent1">
-              <a:shade val="50000"/>
-            </a:schemeClr>
-          </a:lnRef>
-          <a:fillRef idx="1">
-            <a:schemeClr val="accent1"/>
-          </a:fillRef>
-          <a:effectRef idx="0">
-            <a:schemeClr val="accent1"/>
-          </a:effectRef>
-          <a:fontRef idx="minor">
-            <a:schemeClr val="lt1"/>
-          </a:fontRef>
-        </p:style>
-        <p:txBody>
-          <a:bodyPr rot="0" spcFirstLastPara="0" vert="horz" wrap="square" lIns="0" tIns="201168" rIns="0" bIns="0" numCol="1" spcCol="0" rtlCol="0" fromWordArt="0" anchor="t" anchorCtr="0" forceAA="0" compatLnSpc="1">
-            <a:prstTxWarp prst="textNoShape">
-              <a:avLst/>
-            </a:prstTxWarp>
-            <a:noAutofit/>
-          </a:bodyPr>
-          <a:lstStyle/>
-          <a:p>
-            <a:pPr algn="ctr">
-              <a:lnSpc>
-                <a:spcPct val="107000"/>
-              </a:lnSpc>
-              <a:spcAft>
-                <a:spcPts val="1173"/>
-              </a:spcAft>
-            </a:pPr>
-            <a:r>
-              <a:rPr lang="en-US" sz="1760" b="1">
-                <a:solidFill>
-                  <a:srgbClr val="FF0000"/>
-                </a:solidFill>
-                <a:latin typeface="Arial" panose="020B0604020202020204" pitchFamily="34" charset="0"/>
-                <a:ea typeface="Calibri" panose="020F0502020204030204" pitchFamily="34" charset="0"/>
-              </a:rPr>
-              <a:t>EMERGENCY SHUT-OFF</a:t>
-            </a:r>
-            <a:endParaRPr lang="en-US" sz="1760">
-              <a:latin typeface="Times New Roman" panose="02020603050405020304" pitchFamily="18" charset="0"/>
-              <a:ea typeface="Calibri" panose="020F0502020204030204" pitchFamily="34" charset="0"/>
-            </a:endParaRPr>
           </a:p>
         </p:txBody>
       </p:sp>
@@ -4450,79 +4280,6 @@
               <a:t> room walls:</a:t>
             </a:r>
             <a:endParaRPr lang="en-US" sz="1200" dirty="0"/>
-          </a:p>
-        </p:txBody>
-      </p:sp>
-      <p:sp>
-        <p:nvSpPr>
-          <p:cNvPr id="26" name="Rectangle 25"/>
-          <p:cNvSpPr/>
-          <p:nvPr/>
-        </p:nvSpPr>
-        <p:spPr>
-          <a:xfrm>
-            <a:off x="271643" y="4079213"/>
-            <a:ext cx="2682240" cy="670560"/>
-          </a:xfrm>
-          <a:prstGeom prst="rect">
-            <a:avLst/>
-          </a:prstGeom>
-          <a:solidFill>
-            <a:srgbClr val="FFFF00"/>
-          </a:solidFill>
-          <a:ln>
-            <a:solidFill>
-              <a:schemeClr val="tx1"/>
-            </a:solidFill>
-          </a:ln>
-        </p:spPr>
-        <p:style>
-          <a:lnRef idx="2">
-            <a:schemeClr val="accent1">
-              <a:shade val="50000"/>
-            </a:schemeClr>
-          </a:lnRef>
-          <a:fillRef idx="1">
-            <a:schemeClr val="accent1"/>
-          </a:fillRef>
-          <a:effectRef idx="0">
-            <a:schemeClr val="accent1"/>
-          </a:effectRef>
-          <a:fontRef idx="minor">
-            <a:schemeClr val="lt1"/>
-          </a:fontRef>
-        </p:style>
-        <p:txBody>
-          <a:bodyPr rot="0" spcFirstLastPara="0" vert="horz" wrap="square" lIns="0" tIns="201168" rIns="0" bIns="0" numCol="1" spcCol="0" rtlCol="0" fromWordArt="0" anchor="t" anchorCtr="0" forceAA="0" compatLnSpc="1">
-            <a:prstTxWarp prst="textNoShape">
-              <a:avLst/>
-            </a:prstTxWarp>
-            <a:noAutofit/>
-          </a:bodyPr>
-          <a:lstStyle/>
-          <a:p>
-            <a:pPr algn="ctr">
-              <a:lnSpc>
-                <a:spcPct val="107000"/>
-              </a:lnSpc>
-              <a:spcAft>
-                <a:spcPts val="1173"/>
-              </a:spcAft>
-            </a:pPr>
-            <a:r>
-              <a:rPr lang="en-US" sz="1760" b="1">
-                <a:solidFill>
-                  <a:srgbClr val="FF0000"/>
-                </a:solidFill>
-                <a:latin typeface="Arial" panose="020B0604020202020204" pitchFamily="34" charset="0"/>
-                <a:ea typeface="Calibri" panose="020F0502020204030204" pitchFamily="34" charset="0"/>
-              </a:rPr>
-              <a:t>EMERGENCY SHUT-OFF</a:t>
-            </a:r>
-            <a:endParaRPr lang="en-US" sz="1760">
-              <a:latin typeface="Times New Roman" panose="02020603050405020304" pitchFamily="18" charset="0"/>
-              <a:ea typeface="Calibri" panose="020F0502020204030204" pitchFamily="34" charset="0"/>
-            </a:endParaRPr>
           </a:p>
         </p:txBody>
       </p:sp>
@@ -4623,155 +4380,13 @@
           <a:p>
             <a:r>
               <a:rPr lang="en-US" sz="1200" dirty="0" smtClean="0"/>
-              <a:t>E2 closet:</a:t>
+              <a:t>E2 </a:t>
+            </a:r>
+            <a:r>
+              <a:rPr lang="en-US" sz="1200" dirty="0" smtClean="0"/>
+              <a:t>console:</a:t>
             </a:r>
             <a:endParaRPr lang="en-US" sz="1200" dirty="0"/>
-          </a:p>
-        </p:txBody>
-      </p:sp>
-      <p:sp>
-        <p:nvSpPr>
-          <p:cNvPr id="30" name="Rectangle 29"/>
-          <p:cNvSpPr/>
-          <p:nvPr/>
-        </p:nvSpPr>
-        <p:spPr>
-          <a:xfrm>
-            <a:off x="271643" y="4990953"/>
-            <a:ext cx="2682240" cy="670560"/>
-          </a:xfrm>
-          <a:prstGeom prst="rect">
-            <a:avLst/>
-          </a:prstGeom>
-          <a:solidFill>
-            <a:srgbClr val="FFFF00"/>
-          </a:solidFill>
-          <a:ln>
-            <a:solidFill>
-              <a:schemeClr val="tx1"/>
-            </a:solidFill>
-          </a:ln>
-        </p:spPr>
-        <p:style>
-          <a:lnRef idx="2">
-            <a:schemeClr val="accent1">
-              <a:shade val="50000"/>
-            </a:schemeClr>
-          </a:lnRef>
-          <a:fillRef idx="1">
-            <a:schemeClr val="accent1"/>
-          </a:fillRef>
-          <a:effectRef idx="0">
-            <a:schemeClr val="accent1"/>
-          </a:effectRef>
-          <a:fontRef idx="minor">
-            <a:schemeClr val="lt1"/>
-          </a:fontRef>
-        </p:style>
-        <p:txBody>
-          <a:bodyPr rot="0" spcFirstLastPara="0" vert="horz" wrap="square" lIns="0" tIns="201168" rIns="0" bIns="0" numCol="1" spcCol="0" rtlCol="0" fromWordArt="0" anchor="t" anchorCtr="0" forceAA="0" compatLnSpc="1">
-            <a:prstTxWarp prst="textNoShape">
-              <a:avLst/>
-            </a:prstTxWarp>
-            <a:noAutofit/>
-          </a:bodyPr>
-          <a:lstStyle/>
-          <a:p>
-            <a:pPr algn="ctr">
-              <a:lnSpc>
-                <a:spcPct val="107000"/>
-              </a:lnSpc>
-              <a:spcAft>
-                <a:spcPts val="1173"/>
-              </a:spcAft>
-            </a:pPr>
-            <a:r>
-              <a:rPr lang="en-US" sz="1760" b="1">
-                <a:solidFill>
-                  <a:srgbClr val="FF0000"/>
-                </a:solidFill>
-                <a:latin typeface="Arial" panose="020B0604020202020204" pitchFamily="34" charset="0"/>
-                <a:ea typeface="Calibri" panose="020F0502020204030204" pitchFamily="34" charset="0"/>
-              </a:rPr>
-              <a:t>EMERGENCY SHUT-OFF</a:t>
-            </a:r>
-            <a:endParaRPr lang="en-US" sz="1760">
-              <a:latin typeface="Times New Roman" panose="02020603050405020304" pitchFamily="18" charset="0"/>
-              <a:ea typeface="Calibri" panose="020F0502020204030204" pitchFamily="34" charset="0"/>
-            </a:endParaRPr>
-          </a:p>
-        </p:txBody>
-      </p:sp>
-      <p:sp>
-        <p:nvSpPr>
-          <p:cNvPr id="31" name="Rectangle 30"/>
-          <p:cNvSpPr/>
-          <p:nvPr/>
-        </p:nvSpPr>
-        <p:spPr>
-          <a:xfrm>
-            <a:off x="3077789" y="4977620"/>
-            <a:ext cx="2682240" cy="670560"/>
-          </a:xfrm>
-          <a:prstGeom prst="rect">
-            <a:avLst/>
-          </a:prstGeom>
-          <a:solidFill>
-            <a:srgbClr val="FFFF00"/>
-          </a:solidFill>
-          <a:ln>
-            <a:solidFill>
-              <a:schemeClr val="tx1"/>
-            </a:solidFill>
-          </a:ln>
-        </p:spPr>
-        <p:style>
-          <a:lnRef idx="2">
-            <a:schemeClr val="accent1">
-              <a:shade val="50000"/>
-            </a:schemeClr>
-          </a:lnRef>
-          <a:fillRef idx="1">
-            <a:schemeClr val="accent1"/>
-          </a:fillRef>
-          <a:effectRef idx="0">
-            <a:schemeClr val="accent1"/>
-          </a:effectRef>
-          <a:fontRef idx="minor">
-            <a:schemeClr val="lt1"/>
-          </a:fontRef>
-        </p:style>
-        <p:txBody>
-          <a:bodyPr rot="0" spcFirstLastPara="0" vert="horz" wrap="square" lIns="0" tIns="201168" rIns="0" bIns="0" numCol="1" spcCol="0" rtlCol="0" fromWordArt="0" anchor="t" anchorCtr="0" forceAA="0" compatLnSpc="1">
-            <a:prstTxWarp prst="textNoShape">
-              <a:avLst/>
-            </a:prstTxWarp>
-            <a:noAutofit/>
-          </a:bodyPr>
-          <a:lstStyle/>
-          <a:p>
-            <a:pPr algn="ctr">
-              <a:lnSpc>
-                <a:spcPct val="107000"/>
-              </a:lnSpc>
-              <a:spcAft>
-                <a:spcPts val="1173"/>
-              </a:spcAft>
-            </a:pPr>
-            <a:r>
-              <a:rPr lang="en-US" sz="1760" b="1">
-                <a:solidFill>
-                  <a:srgbClr val="FF0000"/>
-                </a:solidFill>
-                <a:latin typeface="Arial" panose="020B0604020202020204" pitchFamily="34" charset="0"/>
-                <a:ea typeface="Calibri" panose="020F0502020204030204" pitchFamily="34" charset="0"/>
-              </a:rPr>
-              <a:t>EMERGENCY SHUT-OFF</a:t>
-            </a:r>
-            <a:endParaRPr lang="en-US" sz="1760">
-              <a:latin typeface="Times New Roman" panose="02020603050405020304" pitchFamily="18" charset="0"/>
-              <a:ea typeface="Calibri" panose="020F0502020204030204" pitchFamily="34" charset="0"/>
-            </a:endParaRPr>
           </a:p>
         </p:txBody>
       </p:sp>
@@ -4943,7 +4558,7 @@
               </a:spcAft>
             </a:pPr>
             <a:r>
-              <a:rPr lang="en-US" sz="1760" b="1">
+              <a:rPr lang="en-US" sz="1760" b="1" dirty="0">
                 <a:solidFill>
                   <a:srgbClr val="FF0000"/>
                 </a:solidFill>
@@ -4952,7 +4567,7 @@
               </a:rPr>
               <a:t>EMERGENCY SHUT-OFF</a:t>
             </a:r>
-            <a:endParaRPr lang="en-US" sz="1760">
+            <a:endParaRPr lang="en-US" sz="1760" dirty="0">
               <a:latin typeface="Times New Roman" panose="02020603050405020304" pitchFamily="18" charset="0"/>
               <a:ea typeface="Calibri" panose="020F0502020204030204" pitchFamily="34" charset="0"/>
             </a:endParaRPr>
@@ -4967,7 +4582,7 @@
         </p:nvGrpSpPr>
         <p:grpSpPr>
           <a:xfrm>
-            <a:off x="2608457" y="2924492"/>
+            <a:off x="2561169" y="2944777"/>
             <a:ext cx="3343874" cy="4954599"/>
             <a:chOff x="-3972143" y="3495467"/>
             <a:chExt cx="3343874" cy="4954599"/>
@@ -5158,13 +4773,6 @@
                 </a:rPr>
                 <a:t>EMERGENCY SHUT-OFF</a:t>
               </a:r>
-              <a:endParaRPr lang="en-US" sz="2640" b="1" dirty="0">
-                <a:solidFill>
-                  <a:srgbClr val="FF0000"/>
-                </a:solidFill>
-                <a:latin typeface="Arial" panose="020B0604020202020204" pitchFamily="34" charset="0"/>
-                <a:cs typeface="Arial" panose="020B0604020202020204" pitchFamily="34" charset="0"/>
-              </a:endParaRPr>
             </a:p>
           </p:txBody>
         </p:sp>
@@ -5207,7 +4815,7 @@
         </p:nvGrpSpPr>
         <p:grpSpPr>
           <a:xfrm>
-            <a:off x="-309151" y="2963593"/>
+            <a:off x="-267893" y="3828376"/>
             <a:ext cx="3343874" cy="4954599"/>
             <a:chOff x="-3972143" y="3495467"/>
             <a:chExt cx="3343874" cy="4954599"/>
@@ -5398,13 +5006,6 @@
                 </a:rPr>
                 <a:t>EMERGENCY SHUT-OFF</a:t>
               </a:r>
-              <a:endParaRPr lang="en-US" sz="2640" b="1" dirty="0">
-                <a:solidFill>
-                  <a:srgbClr val="FF0000"/>
-                </a:solidFill>
-                <a:latin typeface="Arial" panose="020B0604020202020204" pitchFamily="34" charset="0"/>
-                <a:cs typeface="Arial" panose="020B0604020202020204" pitchFamily="34" charset="0"/>
-              </a:endParaRPr>
             </a:p>
           </p:txBody>
         </p:sp>
@@ -5447,7 +5048,7 @@
         </p:nvGrpSpPr>
         <p:grpSpPr>
           <a:xfrm>
-            <a:off x="-247698" y="3786482"/>
+            <a:off x="-288482" y="2939923"/>
             <a:ext cx="3343874" cy="4954599"/>
             <a:chOff x="-3972143" y="3495467"/>
             <a:chExt cx="3343874" cy="4954599"/>
@@ -5638,13 +5239,6 @@
                 </a:rPr>
                 <a:t>EMERGENCY SHUT-OFF</a:t>
               </a:r>
-              <a:endParaRPr lang="en-US" sz="2640" b="1" dirty="0">
-                <a:solidFill>
-                  <a:srgbClr val="FF0000"/>
-                </a:solidFill>
-                <a:latin typeface="Arial" panose="020B0604020202020204" pitchFamily="34" charset="0"/>
-                <a:cs typeface="Arial" panose="020B0604020202020204" pitchFamily="34" charset="0"/>
-              </a:endParaRPr>
             </a:p>
           </p:txBody>
         </p:sp>
@@ -5657,7 +5251,7 @@
         </p:nvGrpSpPr>
         <p:grpSpPr>
           <a:xfrm>
-            <a:off x="2683702" y="3755669"/>
+            <a:off x="2601538" y="3798724"/>
             <a:ext cx="3343874" cy="4954599"/>
             <a:chOff x="-3972143" y="3495467"/>
             <a:chExt cx="3343874" cy="4954599"/>
@@ -5848,13 +5442,6 @@
                 </a:rPr>
                 <a:t>EMERGENCY SHUT-OFF</a:t>
               </a:r>
-              <a:endParaRPr lang="en-US" sz="2640" b="1" dirty="0">
-                <a:solidFill>
-                  <a:srgbClr val="FF0000"/>
-                </a:solidFill>
-                <a:latin typeface="Arial" panose="020B0604020202020204" pitchFamily="34" charset="0"/>
-                <a:cs typeface="Arial" panose="020B0604020202020204" pitchFamily="34" charset="0"/>
-              </a:endParaRPr>
             </a:p>
           </p:txBody>
         </p:sp>
@@ -5966,10 +5553,6 @@
               </a:rPr>
               <a:t>PUSH TO STOP</a:t>
             </a:r>
-            <a:endParaRPr lang="en-US" sz="1100" b="1" dirty="0">
-              <a:latin typeface="Arial" panose="020B0604020202020204" pitchFamily="34" charset="0"/>
-              <a:cs typeface="Arial" panose="020B0604020202020204" pitchFamily="34" charset="0"/>
-            </a:endParaRPr>
           </a:p>
         </p:txBody>
       </p:sp>
@@ -6038,10 +5621,6 @@
               </a:rPr>
               <a:t>PUSH TO STOP</a:t>
             </a:r>
-            <a:endParaRPr lang="en-US" sz="1100" b="1" dirty="0">
-              <a:latin typeface="Arial" panose="020B0604020202020204" pitchFamily="34" charset="0"/>
-              <a:cs typeface="Arial" panose="020B0604020202020204" pitchFamily="34" charset="0"/>
-            </a:endParaRPr>
           </a:p>
         </p:txBody>
       </p:sp>
@@ -6540,6 +6119,142 @@
           </a:fontRef>
         </p:style>
       </p:cxnSp>
+      <p:sp>
+        <p:nvSpPr>
+          <p:cNvPr id="61" name="Oval 60"/>
+          <p:cNvSpPr/>
+          <p:nvPr/>
+        </p:nvSpPr>
+        <p:spPr>
+          <a:xfrm>
+            <a:off x="4851996" y="3020455"/>
+            <a:ext cx="925373" cy="925373"/>
+          </a:xfrm>
+          <a:prstGeom prst="ellipse">
+            <a:avLst/>
+          </a:prstGeom>
+          <a:solidFill>
+            <a:srgbClr val="C00000"/>
+          </a:solidFill>
+          <a:ln>
+            <a:solidFill>
+              <a:schemeClr val="tx1"/>
+            </a:solidFill>
+          </a:ln>
+        </p:spPr>
+        <p:style>
+          <a:lnRef idx="2">
+            <a:schemeClr val="accent1">
+              <a:shade val="50000"/>
+            </a:schemeClr>
+          </a:lnRef>
+          <a:fillRef idx="1">
+            <a:schemeClr val="accent1"/>
+          </a:fillRef>
+          <a:effectRef idx="0">
+            <a:schemeClr val="accent1"/>
+          </a:effectRef>
+          <a:fontRef idx="minor">
+            <a:schemeClr val="lt1"/>
+          </a:fontRef>
+        </p:style>
+        <p:txBody>
+          <a:bodyPr lIns="0" tIns="0" rIns="0" bIns="0" rtlCol="0" anchor="ctr"/>
+          <a:lstStyle/>
+          <a:p>
+            <a:pPr algn="ctr">
+              <a:spcAft>
+                <a:spcPts val="587"/>
+              </a:spcAft>
+            </a:pPr>
+            <a:r>
+              <a:rPr lang="en-US" sz="1100" b="1" dirty="0">
+                <a:latin typeface="Arial" panose="020B0604020202020204" pitchFamily="34" charset="0"/>
+                <a:cs typeface="Arial" panose="020B0604020202020204" pitchFamily="34" charset="0"/>
+              </a:rPr>
+              <a:t>PULL TO START</a:t>
+            </a:r>
+          </a:p>
+          <a:p>
+            <a:pPr algn="ctr"/>
+            <a:r>
+              <a:rPr lang="en-US" sz="1100" b="1" dirty="0">
+                <a:latin typeface="Arial" panose="020B0604020202020204" pitchFamily="34" charset="0"/>
+                <a:cs typeface="Arial" panose="020B0604020202020204" pitchFamily="34" charset="0"/>
+              </a:rPr>
+              <a:t>PUSH TO STOP</a:t>
+            </a:r>
+          </a:p>
+        </p:txBody>
+      </p:sp>
+      <p:sp>
+        <p:nvSpPr>
+          <p:cNvPr id="62" name="Oval 61"/>
+          <p:cNvSpPr/>
+          <p:nvPr/>
+        </p:nvSpPr>
+        <p:spPr>
+          <a:xfrm>
+            <a:off x="936664" y="4821325"/>
+            <a:ext cx="925373" cy="925373"/>
+          </a:xfrm>
+          <a:prstGeom prst="ellipse">
+            <a:avLst/>
+          </a:prstGeom>
+          <a:solidFill>
+            <a:srgbClr val="C00000"/>
+          </a:solidFill>
+          <a:ln>
+            <a:solidFill>
+              <a:schemeClr val="tx1"/>
+            </a:solidFill>
+          </a:ln>
+        </p:spPr>
+        <p:style>
+          <a:lnRef idx="2">
+            <a:schemeClr val="accent1">
+              <a:shade val="50000"/>
+            </a:schemeClr>
+          </a:lnRef>
+          <a:fillRef idx="1">
+            <a:schemeClr val="accent1"/>
+          </a:fillRef>
+          <a:effectRef idx="0">
+            <a:schemeClr val="accent1"/>
+          </a:effectRef>
+          <a:fontRef idx="minor">
+            <a:schemeClr val="lt1"/>
+          </a:fontRef>
+        </p:style>
+        <p:txBody>
+          <a:bodyPr lIns="0" tIns="0" rIns="0" bIns="0" rtlCol="0" anchor="ctr"/>
+          <a:lstStyle/>
+          <a:p>
+            <a:pPr algn="ctr">
+              <a:spcAft>
+                <a:spcPts val="587"/>
+              </a:spcAft>
+            </a:pPr>
+            <a:r>
+              <a:rPr lang="en-US" sz="1100" b="1" dirty="0">
+                <a:latin typeface="Arial" panose="020B0604020202020204" pitchFamily="34" charset="0"/>
+                <a:cs typeface="Arial" panose="020B0604020202020204" pitchFamily="34" charset="0"/>
+              </a:rPr>
+              <a:t>PULL TO START</a:t>
+            </a:r>
+          </a:p>
+          <a:p>
+            <a:pPr algn="ctr"/>
+            <a:r>
+              <a:rPr lang="en-US" sz="1100" b="1" dirty="0">
+                <a:latin typeface="Arial" panose="020B0604020202020204" pitchFamily="34" charset="0"/>
+                <a:cs typeface="Arial" panose="020B0604020202020204" pitchFamily="34" charset="0"/>
+              </a:rPr>
+              <a:t>PUSH TO STOP</a:t>
+            </a:r>
+          </a:p>
+        </p:txBody>
+      </p:sp>
     </p:spTree>
     <p:extLst>
       <p:ext uri="{BB962C8B-B14F-4D97-AF65-F5344CB8AC3E}">

</xml_diff>